<commit_message>
CraTRCRT-18 Crash, Chromattic update
</commit_message>
<xml_diff>
--- a/slides/exo-developer/en/260-CRaSH-XDev-en.pptx
+++ b/slides/exo-developer/en/260-CRaSH-XDev-en.pptx
@@ -23268,15 +23268,7 @@
                   <a:srgbClr val="FFFFFF"/>
                 </a:solidFill>
               </a:rPr>
-              <a:t> </a:t>
-            </a:r>
-            <a:r>
-              <a:rPr lang="en-GB" sz="4800" dirty="0" smtClean="0">
-                <a:solidFill>
-                  <a:srgbClr val="FFFFFF"/>
-                </a:solidFill>
-              </a:rPr>
-              <a:t>Introduction</a:t>
+              <a:t> Introduction</a:t>
             </a:r>
             <a:endParaRPr lang="en-GB" sz="4800" dirty="0">
               <a:solidFill>
@@ -26296,11 +26288,6 @@
               </a:rPr>
               <a:t>Documentation</a:t>
             </a:r>
-            <a:endParaRPr lang="en-US" dirty="0" smtClean="0">
-              <a:latin typeface="Tahoma" pitchFamily="-109" charset="0"/>
-              <a:ea typeface="ＭＳ Ｐゴシック" pitchFamily="-109" charset="-128"/>
-              <a:cs typeface="Tahoma" pitchFamily="-109" charset="0"/>
-            </a:endParaRPr>
           </a:p>
         </p:txBody>
       </p:sp>
@@ -26329,7 +26316,7 @@
                 <a:ea typeface="ＭＳ Ｐゴシック" pitchFamily="-109" charset="-128"/>
                 <a:cs typeface="Tahoma" pitchFamily="-109" charset="0"/>
               </a:rPr>
-              <a:t>http</a:t>
+              <a:t>http://</a:t>
             </a:r>
             <a:r>
               <a:rPr lang="en-US" dirty="0" smtClean="0">
@@ -26337,8 +26324,27 @@
                 <a:ea typeface="ＭＳ Ｐゴシック" pitchFamily="-109" charset="-128"/>
                 <a:cs typeface="Tahoma" pitchFamily="-109" charset="0"/>
               </a:rPr>
-              <a:t>://crsh.googlecode.com</a:t>
-            </a:r>
+              <a:t>crsh.googlecode.com</a:t>
+            </a:r>
+          </a:p>
+          <a:p>
+            <a:pPr>
+              <a:buFont typeface="Wingdings" pitchFamily="2" charset="2"/>
+              <a:buChar char="Ø"/>
+            </a:pPr>
+            <a:r>
+              <a:rPr lang="en-US" dirty="0">
+                <a:latin typeface="Tahoma" pitchFamily="-109" charset="0"/>
+                <a:ea typeface="ＭＳ Ｐゴシック" pitchFamily="-109" charset="-128"/>
+                <a:cs typeface="Tahoma" pitchFamily="-109" charset="0"/>
+              </a:rPr>
+              <a:t>http://crsh.googlecode.com/svn/doc/1.0.0-beta9/index.html</a:t>
+            </a:r>
+            <a:endParaRPr lang="en-US" dirty="0" smtClean="0">
+              <a:latin typeface="Tahoma" pitchFamily="-109" charset="0"/>
+              <a:ea typeface="ＭＳ Ｐゴシック" pitchFamily="-109" charset="-128"/>
+              <a:cs typeface="Tahoma" pitchFamily="-109" charset="0"/>
+            </a:endParaRPr>
           </a:p>
         </p:txBody>
       </p:sp>

</xml_diff>